<commit_message>
Updated with softwareEngineer->arraylist examples
</commit_message>
<xml_diff>
--- a/slides/On-Campus/11_02_ArrayList.pptx
+++ b/slides/On-Campus/11_02_ArrayList.pptx
@@ -8118,15 +8118,7 @@
           <a:p>
             <a:r>
               <a:rPr lang="en-US" dirty="0"/>
-              <a:t>In practical 4, how did you know the size of the array of majors vs. number of majors added to </a:t>
-            </a:r>
-            <a:r>
-              <a:rPr lang="en-US"/>
-              <a:t>the array? </a:t>
-            </a:r>
-            <a:r>
-              <a:rPr lang="en-US" dirty="0"/>
-              <a:t>Did you use a counter? </a:t>
+              <a:t>In practical 4, how did you know the size of the array of majors vs. number of majors added to the array? Did you use a counter? </a:t>
             </a:r>
           </a:p>
         </p:txBody>
@@ -11786,7 +11778,7 @@
 </file>
 
 <file path=ppt/slides/slide7.xml><?xml version="1.0" encoding="utf-8"?>
-<p:sld xmlns:a="http://schemas.openxmlformats.org/drawingml/2006/main" xmlns:r="http://schemas.openxmlformats.org/officeDocument/2006/relationships" xmlns:p="http://schemas.openxmlformats.org/presentationml/2006/main">
+<p:sld xmlns:a="http://schemas.openxmlformats.org/drawingml/2006/main" xmlns:r="http://schemas.openxmlformats.org/officeDocument/2006/relationships" xmlns:p="http://schemas.openxmlformats.org/presentationml/2006/main" show="0">
   <p:cSld>
     <p:spTree>
       <p:nvGrpSpPr>
@@ -14560,13 +14552,13 @@
   <p:clrMapOvr>
     <a:masterClrMapping/>
   </p:clrMapOvr>
-  <mc:AlternateContent xmlns:mc="http://schemas.openxmlformats.org/markup-compatibility/2006" xmlns:p14="http://schemas.microsoft.com/office/powerpoint/2010/main">
-    <mc:Choice Requires="p14">
+  <mc:AlternateContent xmlns:mc="http://schemas.openxmlformats.org/markup-compatibility/2006">
+    <mc:Choice xmlns:p14="http://schemas.microsoft.com/office/powerpoint/2010/main" Requires="p14">
       <p:transition p14:dur="300">
         <p:fade/>
       </p:transition>
     </mc:Choice>
-    <mc:Fallback xmlns="">
+    <mc:Fallback>
       <p:transition>
         <p:fade/>
       </p:transition>
@@ -14576,7 +14568,7 @@
 </file>
 
 <file path=ppt/slides/slide8.xml><?xml version="1.0" encoding="utf-8"?>
-<p:sld xmlns:a="http://schemas.openxmlformats.org/drawingml/2006/main" xmlns:r="http://schemas.openxmlformats.org/officeDocument/2006/relationships" xmlns:p="http://schemas.openxmlformats.org/presentationml/2006/main">
+<p:sld xmlns:a="http://schemas.openxmlformats.org/drawingml/2006/main" xmlns:r="http://schemas.openxmlformats.org/officeDocument/2006/relationships" xmlns:p="http://schemas.openxmlformats.org/presentationml/2006/main" show="0">
   <p:cSld>
     <p:spTree>
       <p:nvGrpSpPr>
@@ -18455,13 +18447,13 @@
   <p:clrMapOvr>
     <a:masterClrMapping/>
   </p:clrMapOvr>
-  <mc:AlternateContent xmlns:mc="http://schemas.openxmlformats.org/markup-compatibility/2006" xmlns:p14="http://schemas.microsoft.com/office/powerpoint/2010/main">
-    <mc:Choice Requires="p14">
+  <mc:AlternateContent xmlns:mc="http://schemas.openxmlformats.org/markup-compatibility/2006">
+    <mc:Choice xmlns:p14="http://schemas.microsoft.com/office/powerpoint/2010/main" Requires="p14">
       <p:transition p14:dur="300">
         <p:fade/>
       </p:transition>
     </mc:Choice>
-    <mc:Fallback xmlns="">
+    <mc:Fallback>
       <p:transition>
         <p:fade/>
       </p:transition>
@@ -18471,7 +18463,7 @@
 </file>
 
 <file path=ppt/slides/slide9.xml><?xml version="1.0" encoding="utf-8"?>
-<p:sld xmlns:a="http://schemas.openxmlformats.org/drawingml/2006/main" xmlns:r="http://schemas.openxmlformats.org/officeDocument/2006/relationships" xmlns:p="http://schemas.openxmlformats.org/presentationml/2006/main">
+<p:sld xmlns:a="http://schemas.openxmlformats.org/drawingml/2006/main" xmlns:r="http://schemas.openxmlformats.org/officeDocument/2006/relationships" xmlns:p="http://schemas.openxmlformats.org/presentationml/2006/main" show="0">
   <p:cSld>
     <p:spTree>
       <p:nvGrpSpPr>
@@ -22351,13 +22343,13 @@
   <p:clrMapOvr>
     <a:masterClrMapping/>
   </p:clrMapOvr>
-  <mc:AlternateContent xmlns:mc="http://schemas.openxmlformats.org/markup-compatibility/2006" xmlns:p14="http://schemas.microsoft.com/office/powerpoint/2010/main">
-    <mc:Choice Requires="p14">
+  <mc:AlternateContent xmlns:mc="http://schemas.openxmlformats.org/markup-compatibility/2006">
+    <mc:Choice xmlns:p14="http://schemas.microsoft.com/office/powerpoint/2010/main" Requires="p14">
       <p:transition p14:dur="300">
         <p:fade/>
       </p:transition>
     </mc:Choice>
-    <mc:Fallback xmlns="">
+    <mc:Fallback>
       <p:transition>
         <p:fade/>
       </p:transition>

</xml_diff>